<commit_message>
correct sequence diagram of list archived
</commit_message>
<xml_diff>
--- a/docs/diagrams/ListArchivedImprovedSequenceDiagram.pptx
+++ b/docs/diagrams/ListArchivedImprovedSequenceDiagram.pptx
@@ -208,7 +208,7 @@
           <a:p>
             <a:fld id="{F5CC4B3F-88C1-4FFA-B1B6-F41C21DC6924}" type="datetimeFigureOut">
               <a:rPr lang="en-US" smtClean="0"/>
-              <a:t>11/4/18</a:t>
+              <a:t>11/11/18</a:t>
             </a:fld>
             <a:endParaRPr lang="en-US"/>
           </a:p>
@@ -654,7 +654,7 @@
           <a:p>
             <a:fld id="{78C97017-6FC3-485B-9764-EAC9E56C1D49}" type="datetimeFigureOut">
               <a:rPr lang="en-US" smtClean="0"/>
-              <a:t>11/4/18</a:t>
+              <a:t>11/11/18</a:t>
             </a:fld>
             <a:endParaRPr lang="en-US"/>
           </a:p>
@@ -822,7 +822,7 @@
           <a:p>
             <a:fld id="{78C97017-6FC3-485B-9764-EAC9E56C1D49}" type="datetimeFigureOut">
               <a:rPr lang="en-US" smtClean="0"/>
-              <a:t>11/4/18</a:t>
+              <a:t>11/11/18</a:t>
             </a:fld>
             <a:endParaRPr lang="en-US"/>
           </a:p>
@@ -1000,7 +1000,7 @@
           <a:p>
             <a:fld id="{78C97017-6FC3-485B-9764-EAC9E56C1D49}" type="datetimeFigureOut">
               <a:rPr lang="en-US" smtClean="0"/>
-              <a:t>11/4/18</a:t>
+              <a:t>11/11/18</a:t>
             </a:fld>
             <a:endParaRPr lang="en-US"/>
           </a:p>
@@ -1168,7 +1168,7 @@
           <a:p>
             <a:fld id="{78C97017-6FC3-485B-9764-EAC9E56C1D49}" type="datetimeFigureOut">
               <a:rPr lang="en-US" smtClean="0"/>
-              <a:t>11/4/18</a:t>
+              <a:t>11/11/18</a:t>
             </a:fld>
             <a:endParaRPr lang="en-US"/>
           </a:p>
@@ -1413,7 +1413,7 @@
           <a:p>
             <a:fld id="{78C97017-6FC3-485B-9764-EAC9E56C1D49}" type="datetimeFigureOut">
               <a:rPr lang="en-US" smtClean="0"/>
-              <a:t>11/4/18</a:t>
+              <a:t>11/11/18</a:t>
             </a:fld>
             <a:endParaRPr lang="en-US"/>
           </a:p>
@@ -1698,7 +1698,7 @@
           <a:p>
             <a:fld id="{78C97017-6FC3-485B-9764-EAC9E56C1D49}" type="datetimeFigureOut">
               <a:rPr lang="en-US" smtClean="0"/>
-              <a:t>11/4/18</a:t>
+              <a:t>11/11/18</a:t>
             </a:fld>
             <a:endParaRPr lang="en-US"/>
           </a:p>
@@ -2117,7 +2117,7 @@
           <a:p>
             <a:fld id="{78C97017-6FC3-485B-9764-EAC9E56C1D49}" type="datetimeFigureOut">
               <a:rPr lang="en-US" smtClean="0"/>
-              <a:t>11/4/18</a:t>
+              <a:t>11/11/18</a:t>
             </a:fld>
             <a:endParaRPr lang="en-US"/>
           </a:p>
@@ -2234,7 +2234,7 @@
           <a:p>
             <a:fld id="{78C97017-6FC3-485B-9764-EAC9E56C1D49}" type="datetimeFigureOut">
               <a:rPr lang="en-US" smtClean="0"/>
-              <a:t>11/4/18</a:t>
+              <a:t>11/11/18</a:t>
             </a:fld>
             <a:endParaRPr lang="en-US"/>
           </a:p>
@@ -2329,7 +2329,7 @@
           <a:p>
             <a:fld id="{78C97017-6FC3-485B-9764-EAC9E56C1D49}" type="datetimeFigureOut">
               <a:rPr lang="en-US" smtClean="0"/>
-              <a:t>11/4/18</a:t>
+              <a:t>11/11/18</a:t>
             </a:fld>
             <a:endParaRPr lang="en-US"/>
           </a:p>
@@ -2604,7 +2604,7 @@
           <a:p>
             <a:fld id="{78C97017-6FC3-485B-9764-EAC9E56C1D49}" type="datetimeFigureOut">
               <a:rPr lang="en-US" smtClean="0"/>
-              <a:t>11/4/18</a:t>
+              <a:t>11/11/18</a:t>
             </a:fld>
             <a:endParaRPr lang="en-US"/>
           </a:p>
@@ -2856,7 +2856,7 @@
           <a:p>
             <a:fld id="{78C97017-6FC3-485B-9764-EAC9E56C1D49}" type="datetimeFigureOut">
               <a:rPr lang="en-US" smtClean="0"/>
-              <a:t>11/4/18</a:t>
+              <a:t>11/11/18</a:t>
             </a:fld>
             <a:endParaRPr lang="en-US"/>
           </a:p>
@@ -3067,7 +3067,7 @@
           <a:p>
             <a:fld id="{78C97017-6FC3-485B-9764-EAC9E56C1D49}" type="datetimeFigureOut">
               <a:rPr lang="en-US" smtClean="0"/>
-              <a:t>11/4/18</a:t>
+              <a:t>11/11/18</a:t>
             </a:fld>
             <a:endParaRPr lang="en-US"/>
           </a:p>
@@ -3504,592 +3504,14 @@
       </p:sp>
       <p:sp>
         <p:nvSpPr>
-          <p:cNvPr id="81" name="Rectangle 65"/>
-          <p:cNvSpPr/>
+          <p:cNvPr id="79" name="TextBox 78"/>
+          <p:cNvSpPr txBox="1"/>
           <p:nvPr/>
         </p:nvSpPr>
         <p:spPr>
           <a:xfrm>
-            <a:off x="282176" y="181425"/>
-            <a:ext cx="5863964" cy="4343400"/>
-          </a:xfrm>
-          <a:prstGeom prst="roundRect">
-            <a:avLst>
-              <a:gd name="adj" fmla="val 3484"/>
-            </a:avLst>
-          </a:prstGeom>
-          <a:solidFill>
-            <a:schemeClr val="accent1">
-              <a:lumMod val="20000"/>
-              <a:lumOff val="80000"/>
-            </a:schemeClr>
-          </a:solidFill>
-          <a:ln w="19050">
-            <a:noFill/>
-          </a:ln>
-          <a:effectLst/>
-        </p:spPr>
-        <p:style>
-          <a:lnRef idx="1">
-            <a:schemeClr val="accent2"/>
-          </a:lnRef>
-          <a:fillRef idx="2">
-            <a:schemeClr val="accent2"/>
-          </a:fillRef>
-          <a:effectRef idx="1">
-            <a:schemeClr val="accent2"/>
-          </a:effectRef>
-          <a:fontRef idx="minor">
-            <a:schemeClr val="dk1"/>
-          </a:fontRef>
-        </p:style>
-        <p:txBody>
-          <a:bodyPr rtlCol="0" anchor="t"/>
-          <a:lstStyle/>
-          <a:p>
-            <a:r>
-              <a:rPr lang="en-US" sz="1200" b="1" dirty="0">
-                <a:solidFill>
-                  <a:srgbClr val="0070C0"/>
-                </a:solidFill>
-              </a:rPr>
-              <a:t>Logic</a:t>
-            </a:r>
-            <a:endParaRPr lang="en-SG" sz="1200" b="1" dirty="0">
-              <a:solidFill>
-                <a:srgbClr val="0070C0"/>
-              </a:solidFill>
-            </a:endParaRPr>
-          </a:p>
-        </p:txBody>
-      </p:sp>
-      <p:sp>
-        <p:nvSpPr>
-          <p:cNvPr id="2" name="Rectangle 62"/>
-          <p:cNvSpPr/>
-          <p:nvPr/>
-        </p:nvSpPr>
-        <p:spPr>
-          <a:xfrm>
-            <a:off x="984411" y="543946"/>
-            <a:ext cx="1455629" cy="346760"/>
-          </a:xfrm>
-          <a:prstGeom prst="rect">
-            <a:avLst/>
-          </a:prstGeom>
-          <a:solidFill>
-            <a:srgbClr val="0070C0"/>
-          </a:solidFill>
-          <a:ln w="19050">
-            <a:solidFill>
-              <a:srgbClr val="0070C0"/>
-            </a:solidFill>
-          </a:ln>
-          <a:effectLst/>
-        </p:spPr>
-        <p:style>
-          <a:lnRef idx="1">
-            <a:schemeClr val="accent2"/>
-          </a:lnRef>
-          <a:fillRef idx="2">
-            <a:schemeClr val="accent2"/>
-          </a:fillRef>
-          <a:effectRef idx="1">
-            <a:schemeClr val="accent2"/>
-          </a:effectRef>
-          <a:fontRef idx="minor">
-            <a:schemeClr val="dk1"/>
-          </a:fontRef>
-        </p:style>
-        <p:txBody>
-          <a:bodyPr rtlCol="0" anchor="ctr"/>
-          <a:lstStyle/>
-          <a:p>
-            <a:pPr algn="ctr"/>
-            <a:r>
-              <a:rPr lang="en-US" sz="1600" dirty="0">
-                <a:solidFill>
-                  <a:schemeClr val="bg1"/>
-                </a:solidFill>
-              </a:rPr>
-              <a:t>:</a:t>
-            </a:r>
-            <a:r>
-              <a:rPr lang="en-US" sz="1600" dirty="0" err="1">
-                <a:solidFill>
-                  <a:schemeClr val="bg1"/>
-                </a:solidFill>
-              </a:rPr>
-              <a:t>LogicManager</a:t>
-            </a:r>
-            <a:endParaRPr lang="en-SG" sz="1600" dirty="0">
-              <a:solidFill>
-                <a:schemeClr val="bg1"/>
-              </a:solidFill>
-            </a:endParaRPr>
-          </a:p>
-        </p:txBody>
-      </p:sp>
-      <p:cxnSp>
-        <p:nvCxnSpPr>
-          <p:cNvPr id="5" name="Straight Connector 4"/>
-          <p:cNvCxnSpPr>
-            <a:cxnSpLocks/>
-          </p:cNvCxnSpPr>
-          <p:nvPr/>
-        </p:nvCxnSpPr>
-        <p:spPr>
-          <a:xfrm>
-            <a:off x="1712222" y="907620"/>
-            <a:ext cx="0" cy="3481399"/>
-          </a:xfrm>
-          <a:prstGeom prst="line">
-            <a:avLst/>
-          </a:prstGeom>
-          <a:ln w="19050">
-            <a:solidFill>
-              <a:srgbClr val="0070C0"/>
-            </a:solidFill>
-            <a:prstDash val="sysDash"/>
-          </a:ln>
-          <a:effectLst/>
-        </p:spPr>
-        <p:style>
-          <a:lnRef idx="1">
-            <a:schemeClr val="accent1"/>
-          </a:lnRef>
-          <a:fillRef idx="2">
-            <a:schemeClr val="accent1"/>
-          </a:fillRef>
-          <a:effectRef idx="1">
-            <a:schemeClr val="accent1"/>
-          </a:effectRef>
-          <a:fontRef idx="minor">
-            <a:schemeClr val="dk1"/>
-          </a:fontRef>
-        </p:style>
-      </p:cxnSp>
-      <p:sp>
-        <p:nvSpPr>
-          <p:cNvPr id="6" name="Rectangle 5"/>
-          <p:cNvSpPr/>
-          <p:nvPr/>
-        </p:nvSpPr>
-        <p:spPr>
-          <a:xfrm>
-            <a:off x="1640214" y="1258313"/>
-            <a:ext cx="152400" cy="2932689"/>
-          </a:xfrm>
-          <a:prstGeom prst="rect">
-            <a:avLst/>
-          </a:prstGeom>
-          <a:solidFill>
-            <a:srgbClr val="0070C0"/>
-          </a:solidFill>
-          <a:ln>
-            <a:solidFill>
-              <a:srgbClr val="0070C0"/>
-            </a:solidFill>
-          </a:ln>
-          <a:effectLst/>
-        </p:spPr>
-        <p:style>
-          <a:lnRef idx="1">
-            <a:schemeClr val="accent3"/>
-          </a:lnRef>
-          <a:fillRef idx="2">
-            <a:schemeClr val="accent3"/>
-          </a:fillRef>
-          <a:effectRef idx="1">
-            <a:schemeClr val="accent3"/>
-          </a:effectRef>
-          <a:fontRef idx="minor">
-            <a:schemeClr val="dk1"/>
-          </a:fontRef>
-        </p:style>
-        <p:txBody>
-          <a:bodyPr rtlCol="0" anchor="ctr"/>
-          <a:lstStyle/>
-          <a:p>
-            <a:pPr algn="ctr"/>
-            <a:endParaRPr lang="en-SG" sz="1400"/>
-          </a:p>
-        </p:txBody>
-      </p:sp>
-      <p:sp>
-        <p:nvSpPr>
-          <p:cNvPr id="16" name="Rectangle 62"/>
-          <p:cNvSpPr/>
-          <p:nvPr/>
-        </p:nvSpPr>
-        <p:spPr>
-          <a:xfrm>
-            <a:off x="3344686" y="423022"/>
-            <a:ext cx="1649391" cy="467684"/>
-          </a:xfrm>
-          <a:prstGeom prst="rect">
-            <a:avLst/>
-          </a:prstGeom>
-          <a:solidFill>
-            <a:srgbClr val="0070C0"/>
-          </a:solidFill>
-          <a:ln w="19050">
-            <a:solidFill>
-              <a:srgbClr val="0070C0"/>
-            </a:solidFill>
-          </a:ln>
-          <a:effectLst/>
-        </p:spPr>
-        <p:style>
-          <a:lnRef idx="1">
-            <a:schemeClr val="accent2"/>
-          </a:lnRef>
-          <a:fillRef idx="2">
-            <a:schemeClr val="accent2"/>
-          </a:fillRef>
-          <a:effectRef idx="1">
-            <a:schemeClr val="accent2"/>
-          </a:effectRef>
-          <a:fontRef idx="minor">
-            <a:schemeClr val="dk1"/>
-          </a:fontRef>
-        </p:style>
-        <p:txBody>
-          <a:bodyPr rtlCol="0" anchor="ctr"/>
-          <a:lstStyle/>
-          <a:p>
-            <a:pPr algn="ctr"/>
-            <a:r>
-              <a:rPr lang="en-US" sz="1600" dirty="0">
-                <a:solidFill>
-                  <a:schemeClr val="bg1"/>
-                </a:solidFill>
-              </a:rPr>
-              <a:t>:</a:t>
-            </a:r>
-            <a:r>
-              <a:rPr lang="en-US" sz="1600" dirty="0" err="1">
-                <a:solidFill>
-                  <a:schemeClr val="bg1"/>
-                </a:solidFill>
-              </a:rPr>
-              <a:t>SchedulePlannerParser</a:t>
-            </a:r>
-            <a:endParaRPr lang="en-SG" sz="1600" dirty="0">
-              <a:solidFill>
-                <a:schemeClr val="bg1"/>
-              </a:solidFill>
-            </a:endParaRPr>
-          </a:p>
-        </p:txBody>
-      </p:sp>
-      <p:cxnSp>
-        <p:nvCxnSpPr>
-          <p:cNvPr id="17" name="Straight Connector 16"/>
-          <p:cNvCxnSpPr>
-            <a:cxnSpLocks/>
-          </p:cNvCxnSpPr>
-          <p:nvPr/>
-        </p:nvCxnSpPr>
-        <p:spPr>
-          <a:xfrm>
-            <a:off x="4151850" y="907617"/>
-            <a:ext cx="0" cy="1482984"/>
-          </a:xfrm>
-          <a:prstGeom prst="line">
-            <a:avLst/>
-          </a:prstGeom>
-          <a:ln w="19050">
-            <a:solidFill>
-              <a:srgbClr val="0070C0"/>
-            </a:solidFill>
-            <a:prstDash val="sysDash"/>
-          </a:ln>
-          <a:effectLst/>
-        </p:spPr>
-        <p:style>
-          <a:lnRef idx="1">
-            <a:schemeClr val="accent1"/>
-          </a:lnRef>
-          <a:fillRef idx="2">
-            <a:schemeClr val="accent1"/>
-          </a:fillRef>
-          <a:effectRef idx="1">
-            <a:schemeClr val="accent1"/>
-          </a:effectRef>
-          <a:fontRef idx="minor">
-            <a:schemeClr val="dk1"/>
-          </a:fontRef>
-        </p:style>
-      </p:cxnSp>
-      <p:sp>
-        <p:nvSpPr>
-          <p:cNvPr id="18" name="Rectangle 17"/>
-          <p:cNvSpPr/>
-          <p:nvPr/>
-        </p:nvSpPr>
-        <p:spPr>
-          <a:xfrm>
-            <a:off x="4079843" y="1365810"/>
-            <a:ext cx="154408" cy="767790"/>
-          </a:xfrm>
-          <a:prstGeom prst="rect">
-            <a:avLst/>
-          </a:prstGeom>
-          <a:solidFill>
-            <a:srgbClr val="0070C0"/>
-          </a:solidFill>
-          <a:ln>
-            <a:solidFill>
-              <a:srgbClr val="0070C0"/>
-            </a:solidFill>
-          </a:ln>
-          <a:effectLst/>
-        </p:spPr>
-        <p:style>
-          <a:lnRef idx="1">
-            <a:schemeClr val="accent3"/>
-          </a:lnRef>
-          <a:fillRef idx="2">
-            <a:schemeClr val="accent3"/>
-          </a:fillRef>
-          <a:effectRef idx="1">
-            <a:schemeClr val="accent3"/>
-          </a:effectRef>
-          <a:fontRef idx="minor">
-            <a:schemeClr val="dk1"/>
-          </a:fontRef>
-        </p:style>
-        <p:txBody>
-          <a:bodyPr rtlCol="0" anchor="ctr"/>
-          <a:lstStyle/>
-          <a:p>
-            <a:pPr algn="ctr"/>
-            <a:endParaRPr lang="en-SG" sz="1400"/>
-          </a:p>
-        </p:txBody>
-      </p:sp>
-      <p:cxnSp>
-        <p:nvCxnSpPr>
-          <p:cNvPr id="20" name="Straight Connector 19"/>
-          <p:cNvCxnSpPr>
-            <a:cxnSpLocks/>
-            <a:stCxn id="21" idx="0"/>
-          </p:cNvCxnSpPr>
-          <p:nvPr/>
-        </p:nvCxnSpPr>
-        <p:spPr>
-          <a:xfrm flipH="1">
-            <a:off x="5417322" y="1600203"/>
-            <a:ext cx="17943" cy="2682571"/>
-          </a:xfrm>
-          <a:prstGeom prst="line">
-            <a:avLst/>
-          </a:prstGeom>
-          <a:ln w="19050">
-            <a:solidFill>
-              <a:srgbClr val="0070C0"/>
-            </a:solidFill>
-            <a:prstDash val="sysDash"/>
-          </a:ln>
-          <a:effectLst/>
-        </p:spPr>
-        <p:style>
-          <a:lnRef idx="1">
-            <a:schemeClr val="accent1"/>
-          </a:lnRef>
-          <a:fillRef idx="2">
-            <a:schemeClr val="accent1"/>
-          </a:fillRef>
-          <a:effectRef idx="1">
-            <a:schemeClr val="accent1"/>
-          </a:effectRef>
-          <a:fontRef idx="minor">
-            <a:schemeClr val="dk1"/>
-          </a:fontRef>
-        </p:style>
-      </p:cxnSp>
-      <p:sp>
-        <p:nvSpPr>
-          <p:cNvPr id="21" name="Rectangle 20"/>
-          <p:cNvSpPr/>
-          <p:nvPr/>
-        </p:nvSpPr>
-        <p:spPr>
-          <a:xfrm>
-            <a:off x="5359063" y="1600202"/>
-            <a:ext cx="152400" cy="276003"/>
-          </a:xfrm>
-          <a:prstGeom prst="rect">
-            <a:avLst/>
-          </a:prstGeom>
-          <a:solidFill>
-            <a:srgbClr val="0070C0"/>
-          </a:solidFill>
-          <a:ln>
-            <a:solidFill>
-              <a:srgbClr val="0070C0"/>
-            </a:solidFill>
-          </a:ln>
-          <a:effectLst/>
-        </p:spPr>
-        <p:style>
-          <a:lnRef idx="1">
-            <a:schemeClr val="accent3"/>
-          </a:lnRef>
-          <a:fillRef idx="2">
-            <a:schemeClr val="accent3"/>
-          </a:fillRef>
-          <a:effectRef idx="1">
-            <a:schemeClr val="accent3"/>
-          </a:effectRef>
-          <a:fontRef idx="minor">
-            <a:schemeClr val="dk1"/>
-          </a:fontRef>
-        </p:style>
-        <p:txBody>
-          <a:bodyPr rtlCol="0" anchor="ctr"/>
-          <a:lstStyle/>
-          <a:p>
-            <a:pPr algn="ctr"/>
-            <a:endParaRPr lang="en-SG" sz="1400"/>
-          </a:p>
-        </p:txBody>
-      </p:sp>
-      <p:cxnSp>
-        <p:nvCxnSpPr>
-          <p:cNvPr id="23" name="Straight Arrow Connector 22"/>
-          <p:cNvCxnSpPr/>
-          <p:nvPr/>
-        </p:nvCxnSpPr>
-        <p:spPr>
-          <a:xfrm>
-            <a:off x="520365" y="1261999"/>
-            <a:ext cx="1119851" cy="0"/>
-          </a:xfrm>
-          <a:prstGeom prst="straightConnector1">
-            <a:avLst/>
-          </a:prstGeom>
-          <a:ln w="19050">
-            <a:solidFill>
-              <a:srgbClr val="00B050"/>
-            </a:solidFill>
-            <a:tailEnd type="arrow"/>
-          </a:ln>
-        </p:spPr>
-        <p:style>
-          <a:lnRef idx="1">
-            <a:schemeClr val="accent1"/>
-          </a:lnRef>
-          <a:fillRef idx="0">
-            <a:schemeClr val="accent1"/>
-          </a:fillRef>
-          <a:effectRef idx="0">
-            <a:schemeClr val="accent1"/>
-          </a:effectRef>
-          <a:fontRef idx="minor">
-            <a:schemeClr val="tx1"/>
-          </a:fontRef>
-        </p:style>
-      </p:cxnSp>
-      <p:sp>
-        <p:nvSpPr>
-          <p:cNvPr id="26" name="TextBox 25"/>
-          <p:cNvSpPr txBox="1"/>
-          <p:nvPr/>
-        </p:nvSpPr>
-        <p:spPr>
-          <a:xfrm>
-            <a:off x="139364" y="990603"/>
-            <a:ext cx="1611621" cy="430887"/>
-          </a:xfrm>
-          <a:prstGeom prst="rect">
-            <a:avLst/>
-          </a:prstGeom>
-          <a:noFill/>
-        </p:spPr>
-        <p:txBody>
-          <a:bodyPr wrap="square" lIns="0" tIns="0" rIns="0" bIns="0" rtlCol="0">
-            <a:spAutoFit/>
-          </a:bodyPr>
-          <a:lstStyle/>
-          <a:p>
-            <a:pPr algn="r"/>
-            <a:r>
-              <a:rPr lang="en-US" sz="1400" dirty="0">
-                <a:solidFill>
-                  <a:srgbClr val="0070C0"/>
-                </a:solidFill>
-              </a:rPr>
-              <a:t>execute(“</a:t>
-            </a:r>
-            <a:r>
-              <a:rPr lang="en-US" altLang="zh-CN" sz="1400" dirty="0" err="1">
-                <a:solidFill>
-                  <a:srgbClr val="0070C0"/>
-                </a:solidFill>
-              </a:rPr>
-              <a:t>listarchived</a:t>
-            </a:r>
-            <a:r>
-              <a:rPr lang="en-US" sz="1400" dirty="0">
-                <a:solidFill>
-                  <a:srgbClr val="0070C0"/>
-                </a:solidFill>
-              </a:rPr>
-              <a:t>”)</a:t>
-            </a:r>
-          </a:p>
-        </p:txBody>
-      </p:sp>
-      <p:cxnSp>
-        <p:nvCxnSpPr>
-          <p:cNvPr id="28" name="Straight Arrow Connector 27"/>
-          <p:cNvCxnSpPr>
-            <a:cxnSpLocks/>
-          </p:cNvCxnSpPr>
-          <p:nvPr/>
-        </p:nvCxnSpPr>
-        <p:spPr>
-          <a:xfrm>
-            <a:off x="4191401" y="1512342"/>
-            <a:ext cx="634262" cy="0"/>
-          </a:xfrm>
-          <a:prstGeom prst="straightConnector1">
-            <a:avLst/>
-          </a:prstGeom>
-          <a:ln w="19050">
-            <a:solidFill>
-              <a:srgbClr val="0070C0"/>
-            </a:solidFill>
-            <a:tailEnd type="arrow"/>
-          </a:ln>
-        </p:spPr>
-        <p:style>
-          <a:lnRef idx="1">
-            <a:schemeClr val="accent1"/>
-          </a:lnRef>
-          <a:fillRef idx="0">
-            <a:schemeClr val="accent1"/>
-          </a:fillRef>
-          <a:effectRef idx="0">
-            <a:schemeClr val="accent1"/>
-          </a:effectRef>
-          <a:fontRef idx="minor">
-            <a:schemeClr val="tx1"/>
-          </a:fontRef>
-        </p:style>
-      </p:cxnSp>
-      <p:sp>
-        <p:nvSpPr>
-          <p:cNvPr id="29" name="TextBox 28"/>
-          <p:cNvSpPr txBox="1"/>
-          <p:nvPr/>
-        </p:nvSpPr>
-        <p:spPr>
-          <a:xfrm>
-            <a:off x="3344687" y="2484071"/>
-            <a:ext cx="855809" cy="215444"/>
+            <a:off x="5539485" y="2555983"/>
+            <a:ext cx="1448717" cy="184666"/>
           </a:xfrm>
           <a:prstGeom prst="rect">
             <a:avLst/>
@@ -4114,211 +3536,6 @@
           </a:lstStyle>
           <a:p>
             <a:r>
-              <a:rPr lang="en-US" dirty="0"/>
-              <a:t>execute()</a:t>
-            </a:r>
-          </a:p>
-        </p:txBody>
-      </p:sp>
-      <p:cxnSp>
-        <p:nvCxnSpPr>
-          <p:cNvPr id="34" name="Straight Arrow Connector 33"/>
-          <p:cNvCxnSpPr>
-            <a:cxnSpLocks/>
-          </p:cNvCxnSpPr>
-          <p:nvPr/>
-        </p:nvCxnSpPr>
-        <p:spPr>
-          <a:xfrm flipV="1">
-            <a:off x="4210373" y="1875246"/>
-            <a:ext cx="1115839" cy="2989"/>
-          </a:xfrm>
-          <a:prstGeom prst="straightConnector1">
-            <a:avLst/>
-          </a:prstGeom>
-          <a:ln w="19050">
-            <a:solidFill>
-              <a:srgbClr val="0070C0"/>
-            </a:solidFill>
-            <a:prstDash val="sysDash"/>
-            <a:headEnd type="arrow" w="med" len="med"/>
-            <a:tailEnd type="none" w="med" len="med"/>
-          </a:ln>
-        </p:spPr>
-        <p:style>
-          <a:lnRef idx="1">
-            <a:schemeClr val="accent1"/>
-          </a:lnRef>
-          <a:fillRef idx="0">
-            <a:schemeClr val="accent1"/>
-          </a:fillRef>
-          <a:effectRef idx="0">
-            <a:schemeClr val="accent1"/>
-          </a:effectRef>
-          <a:fontRef idx="minor">
-            <a:schemeClr val="tx1"/>
-          </a:fontRef>
-        </p:style>
-      </p:cxnSp>
-      <p:cxnSp>
-        <p:nvCxnSpPr>
-          <p:cNvPr id="35" name="Straight Arrow Connector 34"/>
-          <p:cNvCxnSpPr>
-            <a:cxnSpLocks/>
-          </p:cNvCxnSpPr>
-          <p:nvPr/>
-        </p:nvCxnSpPr>
-        <p:spPr>
-          <a:xfrm>
-            <a:off x="1792617" y="2133600"/>
-            <a:ext cx="2348067" cy="0"/>
-          </a:xfrm>
-          <a:prstGeom prst="straightConnector1">
-            <a:avLst/>
-          </a:prstGeom>
-          <a:ln w="19050">
-            <a:solidFill>
-              <a:srgbClr val="0070C0"/>
-            </a:solidFill>
-            <a:prstDash val="sysDash"/>
-            <a:headEnd type="arrow" w="med" len="med"/>
-            <a:tailEnd type="none" w="med" len="med"/>
-          </a:ln>
-        </p:spPr>
-        <p:style>
-          <a:lnRef idx="1">
-            <a:schemeClr val="accent1"/>
-          </a:lnRef>
-          <a:fillRef idx="0">
-            <a:schemeClr val="accent1"/>
-          </a:fillRef>
-          <a:effectRef idx="0">
-            <a:schemeClr val="accent1"/>
-          </a:effectRef>
-          <a:fontRef idx="minor">
-            <a:schemeClr val="tx1"/>
-          </a:fontRef>
-        </p:style>
-      </p:cxnSp>
-      <p:cxnSp>
-        <p:nvCxnSpPr>
-          <p:cNvPr id="37" name="Straight Arrow Connector 36"/>
-          <p:cNvCxnSpPr/>
-          <p:nvPr/>
-        </p:nvCxnSpPr>
-        <p:spPr>
-          <a:xfrm>
-            <a:off x="482265" y="4191000"/>
-            <a:ext cx="1196051" cy="0"/>
-          </a:xfrm>
-          <a:prstGeom prst="straightConnector1">
-            <a:avLst/>
-          </a:prstGeom>
-          <a:ln w="19050">
-            <a:solidFill>
-              <a:schemeClr val="accent1"/>
-            </a:solidFill>
-            <a:prstDash val="sysDash"/>
-            <a:headEnd type="arrow" w="med" len="med"/>
-            <a:tailEnd type="none" w="med" len="med"/>
-          </a:ln>
-        </p:spPr>
-        <p:style>
-          <a:lnRef idx="1">
-            <a:schemeClr val="accent1"/>
-          </a:lnRef>
-          <a:fillRef idx="0">
-            <a:schemeClr val="accent1"/>
-          </a:fillRef>
-          <a:effectRef idx="0">
-            <a:schemeClr val="accent1"/>
-          </a:effectRef>
-          <a:fontRef idx="minor">
-            <a:schemeClr val="tx1"/>
-          </a:fontRef>
-        </p:style>
-      </p:cxnSp>
-      <p:sp>
-        <p:nvSpPr>
-          <p:cNvPr id="65" name="Rectangle 64"/>
-          <p:cNvSpPr/>
-          <p:nvPr/>
-        </p:nvSpPr>
-        <p:spPr>
-          <a:xfrm>
-            <a:off x="5326211" y="2375877"/>
-            <a:ext cx="162824" cy="1659370"/>
-          </a:xfrm>
-          <a:prstGeom prst="rect">
-            <a:avLst/>
-          </a:prstGeom>
-          <a:solidFill>
-            <a:srgbClr val="0070C0"/>
-          </a:solidFill>
-          <a:ln>
-            <a:solidFill>
-              <a:srgbClr val="0070C0"/>
-            </a:solidFill>
-          </a:ln>
-          <a:effectLst/>
-        </p:spPr>
-        <p:style>
-          <a:lnRef idx="1">
-            <a:schemeClr val="accent3"/>
-          </a:lnRef>
-          <a:fillRef idx="2">
-            <a:schemeClr val="accent3"/>
-          </a:fillRef>
-          <a:effectRef idx="1">
-            <a:schemeClr val="accent3"/>
-          </a:effectRef>
-          <a:fontRef idx="minor">
-            <a:schemeClr val="dk1"/>
-          </a:fontRef>
-        </p:style>
-        <p:txBody>
-          <a:bodyPr rtlCol="0" anchor="ctr"/>
-          <a:lstStyle/>
-          <a:p>
-            <a:pPr algn="ctr"/>
-            <a:endParaRPr lang="en-SG" sz="1400"/>
-          </a:p>
-        </p:txBody>
-      </p:sp>
-      <p:sp>
-        <p:nvSpPr>
-          <p:cNvPr id="79" name="TextBox 78"/>
-          <p:cNvSpPr txBox="1"/>
-          <p:nvPr/>
-        </p:nvSpPr>
-        <p:spPr>
-          <a:xfrm>
-            <a:off x="5539485" y="2555983"/>
-            <a:ext cx="1448717" cy="184666"/>
-          </a:xfrm>
-          <a:prstGeom prst="rect">
-            <a:avLst/>
-          </a:prstGeom>
-          <a:noFill/>
-        </p:spPr>
-        <p:txBody>
-          <a:bodyPr wrap="square" lIns="0" tIns="0" rIns="0" bIns="0" rtlCol="0">
-            <a:spAutoFit/>
-          </a:bodyPr>
-          <a:lstStyle>
-            <a:defPPr>
-              <a:defRPr lang="en-US"/>
-            </a:defPPr>
-            <a:lvl1pPr algn="r">
-              <a:defRPr sz="1400">
-                <a:solidFill>
-                  <a:srgbClr val="0070C0"/>
-                </a:solidFill>
-              </a:defRPr>
-            </a:lvl1pPr>
-          </a:lstStyle>
-          <a:p>
-            <a:r>
               <a:rPr lang="en-US" altLang="zh-CN" sz="1200" dirty="0">
                 <a:solidFill>
                   <a:srgbClr val="38859D"/>
@@ -4347,179 +3564,6 @@
                 <a:srgbClr val="38859D"/>
               </a:solidFill>
             </a:endParaRPr>
-          </a:p>
-        </p:txBody>
-      </p:sp>
-      <p:sp>
-        <p:nvSpPr>
-          <p:cNvPr id="80" name="TextBox 79"/>
-          <p:cNvSpPr txBox="1"/>
-          <p:nvPr/>
-        </p:nvSpPr>
-        <p:spPr>
-          <a:xfrm>
-            <a:off x="1792617" y="1106151"/>
-            <a:ext cx="2317603" cy="215444"/>
-          </a:xfrm>
-          <a:prstGeom prst="rect">
-            <a:avLst/>
-          </a:prstGeom>
-          <a:noFill/>
-        </p:spPr>
-        <p:txBody>
-          <a:bodyPr wrap="square" lIns="0" tIns="0" rIns="0" bIns="0" rtlCol="0">
-            <a:spAutoFit/>
-          </a:bodyPr>
-          <a:lstStyle>
-            <a:defPPr>
-              <a:defRPr lang="en-US"/>
-            </a:defPPr>
-            <a:lvl1pPr algn="r">
-              <a:defRPr sz="1400">
-                <a:solidFill>
-                  <a:srgbClr val="0070C0"/>
-                </a:solidFill>
-              </a:defRPr>
-            </a:lvl1pPr>
-          </a:lstStyle>
-          <a:p>
-            <a:r>
-              <a:rPr lang="en-US" dirty="0" err="1"/>
-              <a:t>parseCommand</a:t>
-            </a:r>
-            <a:r>
-              <a:rPr lang="en-US" dirty="0"/>
-              <a:t>(“</a:t>
-            </a:r>
-            <a:r>
-              <a:rPr lang="en-US" altLang="zh-CN" dirty="0" err="1"/>
-              <a:t>listarchived</a:t>
-            </a:r>
-            <a:r>
-              <a:rPr lang="en-US" dirty="0"/>
-              <a:t>”)</a:t>
-            </a:r>
-          </a:p>
-        </p:txBody>
-      </p:sp>
-      <p:sp>
-        <p:nvSpPr>
-          <p:cNvPr id="82" name="TextBox 81"/>
-          <p:cNvSpPr txBox="1"/>
-          <p:nvPr/>
-        </p:nvSpPr>
-        <p:spPr>
-          <a:xfrm>
-            <a:off x="3374018" y="3791077"/>
-            <a:ext cx="621216" cy="215444"/>
-          </a:xfrm>
-          <a:prstGeom prst="rect">
-            <a:avLst/>
-          </a:prstGeom>
-          <a:noFill/>
-        </p:spPr>
-        <p:txBody>
-          <a:bodyPr wrap="square" lIns="0" tIns="0" rIns="0" bIns="0" rtlCol="0">
-            <a:spAutoFit/>
-          </a:bodyPr>
-          <a:lstStyle>
-            <a:defPPr>
-              <a:defRPr lang="en-US"/>
-            </a:defPPr>
-            <a:lvl1pPr algn="r">
-              <a:defRPr sz="1400">
-                <a:solidFill>
-                  <a:srgbClr val="0070C0"/>
-                </a:solidFill>
-              </a:defRPr>
-            </a:lvl1pPr>
-          </a:lstStyle>
-          <a:p>
-            <a:r>
-              <a:rPr lang="en-US" dirty="0"/>
-              <a:t>result</a:t>
-            </a:r>
-          </a:p>
-        </p:txBody>
-      </p:sp>
-      <p:sp>
-        <p:nvSpPr>
-          <p:cNvPr id="83" name="TextBox 82"/>
-          <p:cNvSpPr txBox="1"/>
-          <p:nvPr/>
-        </p:nvSpPr>
-        <p:spPr>
-          <a:xfrm>
-            <a:off x="746534" y="3945902"/>
-            <a:ext cx="762000" cy="215444"/>
-          </a:xfrm>
-          <a:prstGeom prst="rect">
-            <a:avLst/>
-          </a:prstGeom>
-          <a:noFill/>
-        </p:spPr>
-        <p:txBody>
-          <a:bodyPr wrap="square" lIns="0" tIns="0" rIns="0" bIns="0" rtlCol="0">
-            <a:spAutoFit/>
-          </a:bodyPr>
-          <a:lstStyle>
-            <a:defPPr>
-              <a:defRPr lang="en-US"/>
-            </a:defPPr>
-            <a:lvl1pPr algn="r">
-              <a:defRPr sz="1400">
-                <a:solidFill>
-                  <a:srgbClr val="0070C0"/>
-                </a:solidFill>
-              </a:defRPr>
-            </a:lvl1pPr>
-          </a:lstStyle>
-          <a:p>
-            <a:r>
-              <a:rPr lang="en-US" dirty="0"/>
-              <a:t>result</a:t>
-            </a:r>
-          </a:p>
-        </p:txBody>
-      </p:sp>
-      <p:sp>
-        <p:nvSpPr>
-          <p:cNvPr id="93" name="TextBox 92"/>
-          <p:cNvSpPr txBox="1"/>
-          <p:nvPr/>
-        </p:nvSpPr>
-        <p:spPr>
-          <a:xfrm>
-            <a:off x="2826058" y="1905794"/>
-            <a:ext cx="220343" cy="215444"/>
-          </a:xfrm>
-          <a:prstGeom prst="rect">
-            <a:avLst/>
-          </a:prstGeom>
-          <a:noFill/>
-        </p:spPr>
-        <p:txBody>
-          <a:bodyPr wrap="square" lIns="0" tIns="0" rIns="0" bIns="0" rtlCol="0">
-            <a:spAutoFit/>
-          </a:bodyPr>
-          <a:lstStyle>
-            <a:defPPr>
-              <a:defRPr lang="en-US"/>
-            </a:defPPr>
-            <a:lvl1pPr algn="r">
-              <a:defRPr sz="1400">
-                <a:solidFill>
-                  <a:srgbClr val="0070C0"/>
-                </a:solidFill>
-              </a:defRPr>
-            </a:lvl1pPr>
-          </a:lstStyle>
-          <a:p>
-            <a:r>
-              <a:rPr lang="en-US" altLang="zh-CN" dirty="0"/>
-              <a:t>l</a:t>
-            </a:r>
-            <a:endParaRPr lang="en-US" dirty="0"/>
           </a:p>
         </p:txBody>
       </p:sp>
@@ -4700,222 +3744,6 @@
               <a:srgbClr val="38859D"/>
             </a:solidFill>
             <a:tailEnd type="arrow"/>
-          </a:ln>
-        </p:spPr>
-        <p:style>
-          <a:lnRef idx="1">
-            <a:schemeClr val="accent1"/>
-          </a:lnRef>
-          <a:fillRef idx="0">
-            <a:schemeClr val="accent1"/>
-          </a:fillRef>
-          <a:effectRef idx="0">
-            <a:schemeClr val="accent1"/>
-          </a:effectRef>
-          <a:fontRef idx="minor">
-            <a:schemeClr val="tx1"/>
-          </a:fontRef>
-        </p:style>
-      </p:cxnSp>
-      <p:sp>
-        <p:nvSpPr>
-          <p:cNvPr id="19" name="Rectangle 62"/>
-          <p:cNvSpPr/>
-          <p:nvPr/>
-        </p:nvSpPr>
-        <p:spPr>
-          <a:xfrm>
-            <a:off x="4792232" y="1119204"/>
-            <a:ext cx="1247086" cy="602028"/>
-          </a:xfrm>
-          <a:prstGeom prst="rect">
-            <a:avLst/>
-          </a:prstGeom>
-          <a:solidFill>
-            <a:srgbClr val="0070C0"/>
-          </a:solidFill>
-          <a:ln w="19050">
-            <a:solidFill>
-              <a:srgbClr val="0070C0"/>
-            </a:solidFill>
-          </a:ln>
-          <a:effectLst/>
-        </p:spPr>
-        <p:style>
-          <a:lnRef idx="1">
-            <a:schemeClr val="accent2"/>
-          </a:lnRef>
-          <a:fillRef idx="2">
-            <a:schemeClr val="accent2"/>
-          </a:fillRef>
-          <a:effectRef idx="1">
-            <a:schemeClr val="accent2"/>
-          </a:effectRef>
-          <a:fontRef idx="minor">
-            <a:schemeClr val="dk1"/>
-          </a:fontRef>
-        </p:style>
-        <p:txBody>
-          <a:bodyPr rtlCol="0" anchor="ctr"/>
-          <a:lstStyle/>
-          <a:p>
-            <a:pPr algn="ctr"/>
-            <a:r>
-              <a:rPr lang="en-US" sz="1400" dirty="0" err="1">
-                <a:solidFill>
-                  <a:schemeClr val="bg1"/>
-                </a:solidFill>
-              </a:rPr>
-              <a:t>l:</a:t>
-            </a:r>
-            <a:r>
-              <a:rPr lang="en-US" altLang="zh-CN" sz="1400" dirty="0" err="1">
-                <a:solidFill>
-                  <a:schemeClr val="bg1"/>
-                </a:solidFill>
-              </a:rPr>
-              <a:t>ListArchived</a:t>
-            </a:r>
-            <a:br>
-              <a:rPr lang="en-US" sz="1400" dirty="0">
-                <a:solidFill>
-                  <a:schemeClr val="bg1"/>
-                </a:solidFill>
-              </a:rPr>
-            </a:br>
-            <a:r>
-              <a:rPr lang="en-US" sz="1400" dirty="0">
-                <a:solidFill>
-                  <a:schemeClr val="bg1"/>
-                </a:solidFill>
-              </a:rPr>
-              <a:t>Command</a:t>
-            </a:r>
-            <a:endParaRPr lang="en-SG" sz="1400" dirty="0">
-              <a:solidFill>
-                <a:schemeClr val="bg1"/>
-              </a:solidFill>
-            </a:endParaRPr>
-          </a:p>
-        </p:txBody>
-      </p:sp>
-      <p:cxnSp>
-        <p:nvCxnSpPr>
-          <p:cNvPr id="66" name="Straight Arrow Connector 65">
-            <a:extLst>
-              <a:ext uri="{FF2B5EF4-FFF2-40B4-BE49-F238E27FC236}">
-                <a16:creationId xmlns:a16="http://schemas.microsoft.com/office/drawing/2014/main" id="{39916E2E-195A-4DC8-B025-B05FA87E6796}"/>
-              </a:ext>
-            </a:extLst>
-          </p:cNvPr>
-          <p:cNvCxnSpPr>
-            <a:cxnSpLocks/>
-          </p:cNvCxnSpPr>
-          <p:nvPr/>
-        </p:nvCxnSpPr>
-        <p:spPr>
-          <a:xfrm>
-            <a:off x="1806582" y="2388723"/>
-            <a:ext cx="3504115" cy="0"/>
-          </a:xfrm>
-          <a:prstGeom prst="straightConnector1">
-            <a:avLst/>
-          </a:prstGeom>
-          <a:ln w="19050">
-            <a:solidFill>
-              <a:srgbClr val="0070C0"/>
-            </a:solidFill>
-            <a:tailEnd type="arrow"/>
-          </a:ln>
-        </p:spPr>
-        <p:style>
-          <a:lnRef idx="1">
-            <a:schemeClr val="accent1"/>
-          </a:lnRef>
-          <a:fillRef idx="0">
-            <a:schemeClr val="accent1"/>
-          </a:fillRef>
-          <a:effectRef idx="0">
-            <a:schemeClr val="accent1"/>
-          </a:effectRef>
-          <a:fontRef idx="minor">
-            <a:schemeClr val="tx1"/>
-          </a:fontRef>
-        </p:style>
-      </p:cxnSp>
-      <p:cxnSp>
-        <p:nvCxnSpPr>
-          <p:cNvPr id="67" name="Straight Arrow Connector 66">
-            <a:extLst>
-              <a:ext uri="{FF2B5EF4-FFF2-40B4-BE49-F238E27FC236}">
-                <a16:creationId xmlns:a16="http://schemas.microsoft.com/office/drawing/2014/main" id="{D881596E-177C-4FDC-8E60-CAB90B3D5FAB}"/>
-              </a:ext>
-            </a:extLst>
-          </p:cNvPr>
-          <p:cNvCxnSpPr>
-            <a:cxnSpLocks/>
-          </p:cNvCxnSpPr>
-          <p:nvPr/>
-        </p:nvCxnSpPr>
-        <p:spPr>
-          <a:xfrm>
-            <a:off x="1809511" y="1363921"/>
-            <a:ext cx="2256705" cy="1"/>
-          </a:xfrm>
-          <a:prstGeom prst="straightConnector1">
-            <a:avLst/>
-          </a:prstGeom>
-          <a:ln w="19050">
-            <a:solidFill>
-              <a:srgbClr val="0070C0"/>
-            </a:solidFill>
-            <a:tailEnd type="arrow"/>
-          </a:ln>
-        </p:spPr>
-        <p:style>
-          <a:lnRef idx="1">
-            <a:schemeClr val="accent1"/>
-          </a:lnRef>
-          <a:fillRef idx="0">
-            <a:schemeClr val="accent1"/>
-          </a:fillRef>
-          <a:effectRef idx="0">
-            <a:schemeClr val="accent1"/>
-          </a:effectRef>
-          <a:fontRef idx="minor">
-            <a:schemeClr val="tx1"/>
-          </a:fontRef>
-        </p:style>
-      </p:cxnSp>
-      <p:cxnSp>
-        <p:nvCxnSpPr>
-          <p:cNvPr id="69" name="Straight Arrow Connector 68">
-            <a:extLst>
-              <a:ext uri="{FF2B5EF4-FFF2-40B4-BE49-F238E27FC236}">
-                <a16:creationId xmlns:a16="http://schemas.microsoft.com/office/drawing/2014/main" id="{7C9F21BC-13A9-471F-825A-2621FD36355F}"/>
-              </a:ext>
-            </a:extLst>
-          </p:cNvPr>
-          <p:cNvCxnSpPr>
-            <a:cxnSpLocks/>
-          </p:cNvCxnSpPr>
-          <p:nvPr/>
-        </p:nvCxnSpPr>
-        <p:spPr>
-          <a:xfrm>
-            <a:off x="1793263" y="4036464"/>
-            <a:ext cx="3532949" cy="17161"/>
-          </a:xfrm>
-          <a:prstGeom prst="straightConnector1">
-            <a:avLst/>
-          </a:prstGeom>
-          <a:ln w="19050">
-            <a:solidFill>
-              <a:srgbClr val="0070C0"/>
-            </a:solidFill>
-            <a:prstDash val="sysDash"/>
-            <a:headEnd type="arrow" w="med" len="med"/>
-            <a:tailEnd type="none" w="med" len="med"/>
           </a:ln>
         </p:spPr>
         <p:style>

</xml_diff>